<commit_message>
Atualiza slides introdução e microservices
</commit_message>
<xml_diff>
--- a/projects/05-microservices/microservices.pptx
+++ b/projects/05-microservices/microservices.pptx
@@ -5,7 +5,7 @@
     <p:sldMasterId id="2147484007" r:id="rId1"/>
   </p:sldMasterIdLst>
   <p:notesMasterIdLst>
-    <p:notesMasterId r:id="rId10"/>
+    <p:notesMasterId r:id="rId11"/>
   </p:notesMasterIdLst>
   <p:sldIdLst>
     <p:sldId id="266" r:id="rId2"/>
@@ -13,9 +13,10 @@
     <p:sldId id="272" r:id="rId4"/>
     <p:sldId id="275" r:id="rId5"/>
     <p:sldId id="274" r:id="rId6"/>
-    <p:sldId id="273" r:id="rId7"/>
-    <p:sldId id="276" r:id="rId8"/>
-    <p:sldId id="277" r:id="rId9"/>
+    <p:sldId id="278" r:id="rId7"/>
+    <p:sldId id="273" r:id="rId8"/>
+    <p:sldId id="276" r:id="rId9"/>
+    <p:sldId id="277" r:id="rId10"/>
   </p:sldIdLst>
   <p:sldSz cx="12192000" cy="6858000"/>
   <p:notesSz cx="6858000" cy="9144000"/>
@@ -204,7 +205,7 @@
           <a:p>
             <a:fld id="{7497B6E1-7C5B-524D-B5EB-5E6695205380}" type="datetimeFigureOut">
               <a:rPr lang="pt-BR" smtClean="0"/>
-              <a:t>04/02/2019</a:t>
+              <a:t>20/03/2019</a:t>
             </a:fld>
             <a:endParaRPr lang="pt-BR" dirty="0"/>
           </a:p>
@@ -642,7 +643,7 @@
           <a:p>
             <a:fld id="{19E7D63B-43B5-8A4C-BD12-76889BE136BD}" type="datetime1">
               <a:rPr lang="en-US" smtClean="0"/>
-              <a:t>2/4/19</a:t>
+              <a:t>3/20/19</a:t>
             </a:fld>
             <a:endParaRPr lang="en-US" dirty="0"/>
           </a:p>
@@ -908,7 +909,7 @@
           <a:p>
             <a:fld id="{124E9894-F119-A64C-B7CB-D7CE860A73BE}" type="datetime1">
               <a:rPr lang="en-US" smtClean="0"/>
-              <a:t>2/4/19</a:t>
+              <a:t>3/20/19</a:t>
             </a:fld>
             <a:endParaRPr lang="en-US" dirty="0"/>
           </a:p>
@@ -1140,7 +1141,7 @@
           <a:p>
             <a:fld id="{124E9894-F119-A64C-B7CB-D7CE860A73BE}" type="datetime1">
               <a:rPr lang="en-US" smtClean="0"/>
-              <a:t>2/4/19</a:t>
+              <a:t>3/20/19</a:t>
             </a:fld>
             <a:endParaRPr lang="en-US" dirty="0"/>
           </a:p>
@@ -1451,7 +1452,7 @@
           <a:p>
             <a:fld id="{124E9894-F119-A64C-B7CB-D7CE860A73BE}" type="datetime1">
               <a:rPr lang="en-US" smtClean="0"/>
-              <a:t>2/4/19</a:t>
+              <a:t>3/20/19</a:t>
             </a:fld>
             <a:endParaRPr lang="en-US" dirty="0"/>
           </a:p>
@@ -1925,7 +1926,7 @@
           <a:p>
             <a:fld id="{B4BBB50B-BAA3-9748-978F-08A7877AB7D9}" type="datetime1">
               <a:rPr lang="en-US" smtClean="0"/>
-              <a:t>2/4/19</a:t>
+              <a:t>3/20/19</a:t>
             </a:fld>
             <a:endParaRPr lang="en-US" dirty="0"/>
           </a:p>
@@ -2472,7 +2473,7 @@
           <a:p>
             <a:fld id="{124E9894-F119-A64C-B7CB-D7CE860A73BE}" type="datetime1">
               <a:rPr lang="en-US" smtClean="0"/>
-              <a:t>2/4/19</a:t>
+              <a:t>3/20/19</a:t>
             </a:fld>
             <a:endParaRPr lang="en-US" dirty="0"/>
           </a:p>
@@ -3244,7 +3245,7 @@
           <a:p>
             <a:fld id="{124E9894-F119-A64C-B7CB-D7CE860A73BE}" type="datetime1">
               <a:rPr lang="en-US" smtClean="0"/>
-              <a:t>2/4/19</a:t>
+              <a:t>3/20/19</a:t>
             </a:fld>
             <a:endParaRPr lang="en-US" dirty="0"/>
           </a:p>
@@ -3420,7 +3421,7 @@
           <a:p>
             <a:fld id="{45040DEA-CE02-EF42-8F10-34F709D8505D}" type="datetime1">
               <a:rPr lang="en-US" smtClean="0"/>
-              <a:t>2/4/19</a:t>
+              <a:t>3/20/19</a:t>
             </a:fld>
             <a:endParaRPr lang="en-US" dirty="0"/>
           </a:p>
@@ -3643,7 +3644,7 @@
           <a:p>
             <a:fld id="{A0C1C801-5706-434E-AB65-DDFBCF1F55D2}" type="datetime1">
               <a:rPr lang="en-US" smtClean="0"/>
-              <a:t>2/4/19</a:t>
+              <a:t>3/20/19</a:t>
             </a:fld>
             <a:endParaRPr lang="en-US" dirty="0"/>
           </a:p>
@@ -3823,7 +3824,7 @@
           <a:p>
             <a:fld id="{39AE0FD8-7D7B-EA4F-8AF8-8B97820A0C5D}" type="datetime1">
               <a:rPr lang="en-US" smtClean="0"/>
-              <a:t>2/4/19</a:t>
+              <a:t>3/20/19</a:t>
             </a:fld>
             <a:endParaRPr lang="en-US" dirty="0"/>
           </a:p>
@@ -4112,7 +4113,7 @@
           <a:p>
             <a:fld id="{7FC94D43-3F68-DC43-8EF0-95FB3D51CCCF}" type="datetime1">
               <a:rPr lang="en-US" smtClean="0"/>
-              <a:t>2/4/19</a:t>
+              <a:t>3/20/19</a:t>
             </a:fld>
             <a:endParaRPr lang="en-US" dirty="0"/>
           </a:p>
@@ -4354,7 +4355,7 @@
           <a:p>
             <a:fld id="{BD42CFC2-1CE8-9045-8C9C-0F183F0FB455}" type="datetime1">
               <a:rPr lang="en-US" smtClean="0"/>
-              <a:t>2/4/19</a:t>
+              <a:t>3/20/19</a:t>
             </a:fld>
             <a:endParaRPr lang="en-US" dirty="0"/>
           </a:p>
@@ -4733,7 +4734,7 @@
           <a:p>
             <a:fld id="{F1B5C6E2-D044-C748-9C41-86C9B2F84EB9}" type="datetime1">
               <a:rPr lang="en-US" smtClean="0"/>
-              <a:t>2/4/19</a:t>
+              <a:t>3/20/19</a:t>
             </a:fld>
             <a:endParaRPr lang="en-US" dirty="0"/>
           </a:p>
@@ -4851,7 +4852,7 @@
           <a:p>
             <a:fld id="{359C32BA-C166-AC45-9FCD-8BF0F43629D9}" type="datetime1">
               <a:rPr lang="en-US" smtClean="0"/>
-              <a:t>2/4/19</a:t>
+              <a:t>3/20/19</a:t>
             </a:fld>
             <a:endParaRPr lang="en-US" dirty="0"/>
           </a:p>
@@ -4946,7 +4947,7 @@
           <a:p>
             <a:fld id="{E5D0D591-4B92-A44B-A0EA-798E76AD0368}" type="datetime1">
               <a:rPr lang="en-US" smtClean="0"/>
-              <a:t>2/4/19</a:t>
+              <a:t>3/20/19</a:t>
             </a:fld>
             <a:endParaRPr lang="en-US" dirty="0"/>
           </a:p>
@@ -5195,7 +5196,7 @@
           <a:p>
             <a:fld id="{8201F472-E17F-4B47-A44B-A2249FA27ED2}" type="datetime1">
               <a:rPr lang="en-US" smtClean="0"/>
-              <a:t>2/4/19</a:t>
+              <a:t>3/20/19</a:t>
             </a:fld>
             <a:endParaRPr lang="en-US" dirty="0"/>
           </a:p>
@@ -5451,7 +5452,7 @@
           <a:p>
             <a:fld id="{8BEFB9EE-CDF2-6F49-80F4-278D1604F10C}" type="datetime1">
               <a:rPr lang="en-US" smtClean="0"/>
-              <a:t>2/4/19</a:t>
+              <a:t>3/20/19</a:t>
             </a:fld>
             <a:endParaRPr lang="en-US" dirty="0"/>
           </a:p>
@@ -5694,7 +5695,7 @@
           <a:p>
             <a:fld id="{124E9894-F119-A64C-B7CB-D7CE860A73BE}" type="datetime1">
               <a:rPr lang="en-US" smtClean="0"/>
-              <a:t>2/4/19</a:t>
+              <a:t>3/20/19</a:t>
             </a:fld>
             <a:endParaRPr lang="en-US" dirty="0"/>
           </a:p>
@@ -9522,8 +9523,19 @@
 </file>
 
 <file path=ppt/slides/slide6.xml><?xml version="1.0" encoding="utf-8"?>
-<p:sld xmlns:a="http://schemas.openxmlformats.org/drawingml/2006/main" xmlns:r="http://schemas.openxmlformats.org/officeDocument/2006/relationships" xmlns:p="http://schemas.openxmlformats.org/presentationml/2006/main">
+<p:sld xmlns:a="http://schemas.openxmlformats.org/drawingml/2006/main" xmlns:r="http://schemas.openxmlformats.org/officeDocument/2006/relationships" xmlns:p="http://schemas.openxmlformats.org/presentationml/2006/main" showMasterSp="0">
   <p:cSld>
+    <p:bg>
+      <p:bgPr>
+        <a:blipFill>
+          <a:blip r:embed="rId2"/>
+          <a:stretch>
+            <a:fillRect/>
+          </a:stretch>
+        </a:blipFill>
+        <a:effectLst/>
+      </p:bgPr>
+    </p:bg>
     <p:spTree>
       <p:nvGrpSpPr>
         <p:cNvPr id="1" name=""/>
@@ -9556,8 +9568,8 @@
         </p:nvSpPr>
         <p:spPr>
           <a:xfrm>
-            <a:off x="755374" y="1908313"/>
-            <a:ext cx="10749238" cy="4228195"/>
+            <a:off x="29979" y="6444711"/>
+            <a:ext cx="6580683" cy="443269"/>
           </a:xfrm>
         </p:spPr>
         <p:txBody>
@@ -9566,11 +9578,20 @@
           </a:bodyPr>
           <a:lstStyle/>
           <a:p>
-            <a:pPr algn="just"/>
-            <a:r>
-              <a:rPr lang="pt" sz="3200" dirty="0"/>
-              <a:t>...</a:t>
-            </a:r>
+            <a:pPr marL="0" indent="0" algn="ctr">
+              <a:buNone/>
+            </a:pPr>
+            <a:r>
+              <a:rPr lang="en-US" sz="2000" dirty="0">
+                <a:hlinkClick r:id="rId3"/>
+              </a:rPr>
+              <a:t>https://nginx.com/blog/nginx-vs-apache-our-view/</a:t>
+            </a:r>
+            <a:r>
+              <a:rPr lang="en-US" sz="2000" dirty="0"/>
+              <a:t> </a:t>
+            </a:r>
+            <a:endParaRPr lang="pt" sz="2000" dirty="0"/>
           </a:p>
         </p:txBody>
       </p:sp>
@@ -9621,8 +9642,8 @@
         </p:nvSpPr>
         <p:spPr>
           <a:xfrm>
-            <a:off x="2629669" y="624110"/>
-            <a:ext cx="9530038" cy="1164933"/>
+            <a:off x="4217857" y="194872"/>
+            <a:ext cx="6994785" cy="1019331"/>
           </a:xfrm>
         </p:spPr>
         <p:txBody>
@@ -9631,17 +9652,14 @@
           </a:bodyPr>
           <a:lstStyle/>
           <a:p>
+            <a:pPr algn="ctr"/>
             <a:r>
               <a:rPr lang="pt-BR" b="1" i="1" dirty="0"/>
-              <a:t>Devo abandonar tudo e passar a usar </a:t>
+              <a:t>Exemplos de arquiteturas de </a:t>
             </a:r>
             <a:r>
               <a:rPr lang="pt-BR" b="1" i="1" dirty="0" err="1"/>
-              <a:t>microserviços</a:t>
-            </a:r>
-            <a:r>
-              <a:rPr lang="pt-BR" b="1" i="1" dirty="0"/>
-              <a:t>?</a:t>
+              <a:t>microservices</a:t>
             </a:r>
             <a:endParaRPr lang="pt-BR" dirty="0"/>
           </a:p>
@@ -9650,7 +9668,7 @@
     </p:spTree>
     <p:extLst>
       <p:ext uri="{BB962C8B-B14F-4D97-AF65-F5344CB8AC3E}">
-        <p14:creationId xmlns:p14="http://schemas.microsoft.com/office/powerpoint/2010/main" val="1967087531"/>
+        <p14:creationId xmlns:p14="http://schemas.microsoft.com/office/powerpoint/2010/main" val="4028913454"/>
       </p:ext>
     </p:extLst>
   </p:cSld>
@@ -9669,6 +9687,9 @@
                     <p:cTn id="3" fill="hold">
                       <p:stCondLst>
                         <p:cond delay="indefinite"/>
+                        <p:cond evt="onBegin" delay="0">
+                          <p:tn val="2"/>
+                        </p:cond>
                       </p:stCondLst>
                       <p:childTnLst>
                         <p:par>
@@ -9678,7 +9699,7 @@
                             </p:stCondLst>
                             <p:childTnLst>
                               <p:par>
-                                <p:cTn id="5" presetID="9" presetClass="entr" presetSubtype="0" fill="hold" grpId="0" nodeType="clickEffect">
+                                <p:cTn id="5" presetID="9" presetClass="entr" presetSubtype="0" fill="hold" grpId="0" nodeType="withEffect">
                                   <p:stCondLst>
                                     <p:cond delay="0"/>
                                   </p:stCondLst>
@@ -9726,67 +9747,6 @@
                       </p:childTnLst>
                     </p:cTn>
                   </p:par>
-                  <p:par>
-                    <p:cTn id="8" fill="hold">
-                      <p:stCondLst>
-                        <p:cond delay="indefinite"/>
-                      </p:stCondLst>
-                      <p:childTnLst>
-                        <p:par>
-                          <p:cTn id="9" fill="hold">
-                            <p:stCondLst>
-                              <p:cond delay="0"/>
-                            </p:stCondLst>
-                            <p:childTnLst>
-                              <p:par>
-                                <p:cTn id="10" presetID="9" presetClass="exit" presetSubtype="0" fill="hold" grpId="1" nodeType="clickEffect">
-                                  <p:stCondLst>
-                                    <p:cond delay="0"/>
-                                  </p:stCondLst>
-                                  <p:childTnLst>
-                                    <p:animEffect transition="out" filter="dissolve">
-                                      <p:cBhvr>
-                                        <p:cTn id="11" dur="500"/>
-                                        <p:tgtEl>
-                                          <p:spTgt spid="3">
-                                            <p:txEl>
-                                              <p:pRg st="0" end="0"/>
-                                            </p:txEl>
-                                          </p:spTgt>
-                                        </p:tgtEl>
-                                      </p:cBhvr>
-                                    </p:animEffect>
-                                    <p:set>
-                                      <p:cBhvr>
-                                        <p:cTn id="12" dur="1" fill="hold">
-                                          <p:stCondLst>
-                                            <p:cond delay="499"/>
-                                          </p:stCondLst>
-                                        </p:cTn>
-                                        <p:tgtEl>
-                                          <p:spTgt spid="3">
-                                            <p:txEl>
-                                              <p:pRg st="0" end="0"/>
-                                            </p:txEl>
-                                          </p:spTgt>
-                                        </p:tgtEl>
-                                        <p:attrNameLst>
-                                          <p:attrName>style.visibility</p:attrName>
-                                        </p:attrNameLst>
-                                      </p:cBhvr>
-                                      <p:to>
-                                        <p:strVal val="hidden"/>
-                                      </p:to>
-                                    </p:set>
-                                  </p:childTnLst>
-                                </p:cTn>
-                              </p:par>
-                            </p:childTnLst>
-                          </p:cTn>
-                        </p:par>
-                      </p:childTnLst>
-                    </p:cTn>
-                  </p:par>
                 </p:childTnLst>
               </p:cTn>
               <p:prevCondLst>
@@ -9810,7 +9770,6 @@
     </p:tnLst>
     <p:bldLst>
       <p:bldP spid="3" grpId="0" uiExpand="1" build="p"/>
-      <p:bldP spid="3" grpId="1" uiExpand="1" build="p"/>
     </p:bldLst>
   </p:timing>
 </p:sld>
@@ -9861,39 +9820,10 @@
           </a:bodyPr>
           <a:lstStyle/>
           <a:p>
-            <a:r>
-              <a:rPr lang="en-US" sz="3200" dirty="0" err="1"/>
-              <a:t>Microserviços</a:t>
-            </a:r>
-            <a:r>
-              <a:rPr lang="en-US" sz="3200" dirty="0"/>
-              <a:t> </a:t>
-            </a:r>
-            <a:r>
-              <a:rPr lang="en-US" sz="3200" dirty="0" err="1"/>
-              <a:t>são</a:t>
-            </a:r>
-            <a:r>
-              <a:rPr lang="en-US" sz="3200" dirty="0"/>
-              <a:t> </a:t>
-            </a:r>
-            <a:r>
-              <a:rPr lang="en-US" sz="3200" dirty="0" err="1"/>
-              <a:t>apenas</a:t>
-            </a:r>
-            <a:r>
-              <a:rPr lang="en-US" sz="3200" dirty="0"/>
-              <a:t> SOA? </a:t>
-            </a:r>
-            <a:r>
-              <a:rPr lang="en-US" sz="3200" dirty="0">
-                <a:hlinkClick r:id="rId2"/>
-              </a:rPr>
-              <a:t>https://youtu.be/wgdBVIX9ifA?t=830</a:t>
-            </a:r>
-            <a:r>
-              <a:rPr lang="en-US" sz="3200" dirty="0"/>
-              <a:t> </a:t>
+            <a:pPr algn="just"/>
+            <a:r>
+              <a:rPr lang="pt" sz="3200" dirty="0"/>
+              <a:t>...</a:t>
             </a:r>
           </a:p>
         </p:txBody>
@@ -9951,14 +9881,21 @@
         </p:spPr>
         <p:txBody>
           <a:bodyPr>
-            <a:normAutofit/>
+            <a:normAutofit fontScale="90000"/>
           </a:bodyPr>
           <a:lstStyle/>
           <a:p>
-            <a:pPr algn="ctr"/>
             <a:r>
               <a:rPr lang="pt-BR" b="1" i="1" dirty="0"/>
-              <a:t>SOA</a:t>
+              <a:t>Devo abandonar tudo e passar a usar </a:t>
+            </a:r>
+            <a:r>
+              <a:rPr lang="pt-BR" b="1" i="1" dirty="0" err="1"/>
+              <a:t>microserviços</a:t>
+            </a:r>
+            <a:r>
+              <a:rPr lang="pt-BR" b="1" i="1" dirty="0"/>
+              <a:t>?</a:t>
             </a:r>
             <a:endParaRPr lang="pt-BR" dirty="0"/>
           </a:p>
@@ -9967,7 +9904,7 @@
     </p:spTree>
     <p:extLst>
       <p:ext uri="{BB962C8B-B14F-4D97-AF65-F5344CB8AC3E}">
-        <p14:creationId xmlns:p14="http://schemas.microsoft.com/office/powerpoint/2010/main" val="1656766264"/>
+        <p14:creationId xmlns:p14="http://schemas.microsoft.com/office/powerpoint/2010/main" val="1967087531"/>
       </p:ext>
     </p:extLst>
   </p:cSld>
@@ -10178,105 +10115,40 @@
           </a:bodyPr>
           <a:lstStyle/>
           <a:p>
-            <a:pPr algn="just"/>
-            <a:r>
-              <a:rPr lang="en-US" sz="2000" dirty="0">
+            <a:r>
+              <a:rPr lang="en-US" sz="3200" dirty="0" err="1"/>
+              <a:t>Microserviços</a:t>
+            </a:r>
+            <a:r>
+              <a:rPr lang="en-US" sz="3200" dirty="0"/>
+              <a:t> </a:t>
+            </a:r>
+            <a:r>
+              <a:rPr lang="en-US" sz="3200" dirty="0" err="1"/>
+              <a:t>são</a:t>
+            </a:r>
+            <a:r>
+              <a:rPr lang="en-US" sz="3200" dirty="0"/>
+              <a:t> </a:t>
+            </a:r>
+            <a:r>
+              <a:rPr lang="en-US" sz="3200" dirty="0" err="1"/>
+              <a:t>apenas</a:t>
+            </a:r>
+            <a:r>
+              <a:rPr lang="en-US" sz="3200" dirty="0"/>
+              <a:t> SOA? </a:t>
+            </a:r>
+            <a:r>
+              <a:rPr lang="en-US" sz="3200" dirty="0">
                 <a:hlinkClick r:id="rId2"/>
               </a:rPr>
-              <a:t>https://www.infoq.com/articles/managing-data-microservices</a:t>
-            </a:r>
-            <a:r>
-              <a:rPr lang="en-US" sz="2000" dirty="0"/>
+              <a:t>https://youtu.be/wgdBVIX9ifA?t=830</a:t>
+            </a:r>
+            <a:r>
+              <a:rPr lang="en-US" sz="3200" dirty="0"/>
               <a:t> </a:t>
             </a:r>
-          </a:p>
-          <a:p>
-            <a:pPr algn="just"/>
-            <a:r>
-              <a:rPr lang="en-US" sz="2000" dirty="0">
-                <a:hlinkClick r:id="rId3"/>
-              </a:rPr>
-              <a:t>https://medium.com/@nathankpeck/microservice-principles-decentralized-data-management-4adaceea173f</a:t>
-            </a:r>
-            <a:r>
-              <a:rPr lang="en-US" sz="2000" dirty="0"/>
-              <a:t> </a:t>
-            </a:r>
-          </a:p>
-          <a:p>
-            <a:pPr algn="just"/>
-            <a:r>
-              <a:rPr lang="en-US" sz="2000" dirty="0">
-                <a:hlinkClick r:id="rId4"/>
-              </a:rPr>
-              <a:t>https://martinfowler.com/articles/microservices.html</a:t>
-            </a:r>
-          </a:p>
-          <a:p>
-            <a:pPr algn="just"/>
-            <a:r>
-              <a:rPr lang="en-US" sz="2000" dirty="0">
-                <a:hlinkClick r:id="rId4"/>
-              </a:rPr>
-              <a:t>https://martinfowler.com/articles/break-monolith-into-microservices.html</a:t>
-            </a:r>
-            <a:r>
-              <a:rPr lang="en-US" sz="2000" dirty="0"/>
-              <a:t> </a:t>
-            </a:r>
-          </a:p>
-          <a:p>
-            <a:pPr algn="just"/>
-            <a:r>
-              <a:rPr lang="en-US" sz="2000" dirty="0">
-                <a:hlinkClick r:id="rId5"/>
-              </a:rPr>
-              <a:t>https://microservices.io</a:t>
-            </a:r>
-            <a:r>
-              <a:rPr lang="en-US" sz="2000" dirty="0"/>
-              <a:t> </a:t>
-            </a:r>
-          </a:p>
-          <a:p>
-            <a:pPr algn="just"/>
-            <a:r>
-              <a:rPr lang="en-US" sz="2000" dirty="0">
-                <a:hlinkClick r:id="rId6"/>
-              </a:rPr>
-              <a:t>https://dzone.com/articles/breaking-the-monolithic-database-in-your-microserv</a:t>
-            </a:r>
-            <a:r>
-              <a:rPr lang="en-US" sz="2000" dirty="0"/>
-              <a:t> </a:t>
-            </a:r>
-          </a:p>
-          <a:p>
-            <a:pPr algn="just"/>
-            <a:r>
-              <a:rPr lang="en-US" sz="2000" dirty="0">
-                <a:hlinkClick r:id="rId7"/>
-              </a:rPr>
-              <a:t>https://auth0.com/blog/an-introduction-to-microservices-part-1/</a:t>
-            </a:r>
-            <a:r>
-              <a:rPr lang="en-US" sz="2000" dirty="0"/>
-              <a:t> </a:t>
-            </a:r>
-          </a:p>
-          <a:p>
-            <a:pPr algn="just"/>
-            <a:r>
-              <a:rPr lang="en-US" sz="2000" dirty="0">
-                <a:hlinkClick r:id="rId8"/>
-              </a:rPr>
-              <a:t>http://blog.christianposta.com/microservices/the-hardest-part-about-microservices-data/</a:t>
-            </a:r>
-            <a:r>
-              <a:rPr lang="en-US" sz="2000" dirty="0"/>
-              <a:t> </a:t>
-            </a:r>
-            <a:endParaRPr lang="pt" sz="2000" dirty="0"/>
           </a:p>
         </p:txBody>
       </p:sp>
@@ -10304,6 +10176,388 @@
             <a:fld id="{2183B7EE-0FBE-B749-875F-ED24F5ECD71F}" type="slidenum">
               <a:rPr lang="en-US" smtClean="0"/>
               <a:t>8</a:t>
+            </a:fld>
+            <a:endParaRPr lang="en-US" dirty="0"/>
+          </a:p>
+        </p:txBody>
+      </p:sp>
+      <p:sp>
+        <p:nvSpPr>
+          <p:cNvPr id="7" name="Title 1">
+            <a:extLst>
+              <a:ext uri="{FF2B5EF4-FFF2-40B4-BE49-F238E27FC236}">
+                <a16:creationId xmlns:a16="http://schemas.microsoft.com/office/drawing/2014/main" id="{B7621E9A-A403-2E4F-903F-60CBC83A635F}"/>
+              </a:ext>
+            </a:extLst>
+          </p:cNvPr>
+          <p:cNvSpPr>
+            <a:spLocks noGrp="1"/>
+          </p:cNvSpPr>
+          <p:nvPr>
+            <p:ph type="title"/>
+          </p:nvPr>
+        </p:nvSpPr>
+        <p:spPr>
+          <a:xfrm>
+            <a:off x="2629669" y="624110"/>
+            <a:ext cx="9530038" cy="1164933"/>
+          </a:xfrm>
+        </p:spPr>
+        <p:txBody>
+          <a:bodyPr>
+            <a:normAutofit/>
+          </a:bodyPr>
+          <a:lstStyle/>
+          <a:p>
+            <a:pPr algn="ctr"/>
+            <a:r>
+              <a:rPr lang="pt-BR" b="1" i="1" dirty="0"/>
+              <a:t>SOA</a:t>
+            </a:r>
+            <a:endParaRPr lang="pt-BR" dirty="0"/>
+          </a:p>
+        </p:txBody>
+      </p:sp>
+    </p:spTree>
+    <p:extLst>
+      <p:ext uri="{BB962C8B-B14F-4D97-AF65-F5344CB8AC3E}">
+        <p14:creationId xmlns:p14="http://schemas.microsoft.com/office/powerpoint/2010/main" val="1656766264"/>
+      </p:ext>
+    </p:extLst>
+  </p:cSld>
+  <p:clrMapOvr>
+    <a:masterClrMapping/>
+  </p:clrMapOvr>
+  <p:timing>
+    <p:tnLst>
+      <p:par>
+        <p:cTn id="1" dur="indefinite" restart="never" nodeType="tmRoot">
+          <p:childTnLst>
+            <p:seq concurrent="1" nextAc="seek">
+              <p:cTn id="2" dur="indefinite" nodeType="mainSeq">
+                <p:childTnLst>
+                  <p:par>
+                    <p:cTn id="3" fill="hold">
+                      <p:stCondLst>
+                        <p:cond delay="indefinite"/>
+                      </p:stCondLst>
+                      <p:childTnLst>
+                        <p:par>
+                          <p:cTn id="4" fill="hold">
+                            <p:stCondLst>
+                              <p:cond delay="0"/>
+                            </p:stCondLst>
+                            <p:childTnLst>
+                              <p:par>
+                                <p:cTn id="5" presetID="9" presetClass="entr" presetSubtype="0" fill="hold" grpId="0" nodeType="clickEffect">
+                                  <p:stCondLst>
+                                    <p:cond delay="0"/>
+                                  </p:stCondLst>
+                                  <p:childTnLst>
+                                    <p:set>
+                                      <p:cBhvr>
+                                        <p:cTn id="6" dur="1" fill="hold">
+                                          <p:stCondLst>
+                                            <p:cond delay="0"/>
+                                          </p:stCondLst>
+                                        </p:cTn>
+                                        <p:tgtEl>
+                                          <p:spTgt spid="3">
+                                            <p:txEl>
+                                              <p:pRg st="0" end="0"/>
+                                            </p:txEl>
+                                          </p:spTgt>
+                                        </p:tgtEl>
+                                        <p:attrNameLst>
+                                          <p:attrName>style.visibility</p:attrName>
+                                        </p:attrNameLst>
+                                      </p:cBhvr>
+                                      <p:to>
+                                        <p:strVal val="visible"/>
+                                      </p:to>
+                                    </p:set>
+                                    <p:animEffect transition="in" filter="dissolve">
+                                      <p:cBhvr>
+                                        <p:cTn id="7" dur="500"/>
+                                        <p:tgtEl>
+                                          <p:spTgt spid="3">
+                                            <p:txEl>
+                                              <p:pRg st="0" end="0"/>
+                                            </p:txEl>
+                                          </p:spTgt>
+                                        </p:tgtEl>
+                                      </p:cBhvr>
+                                    </p:animEffect>
+                                  </p:childTnLst>
+                                </p:cTn>
+                              </p:par>
+                            </p:childTnLst>
+                          </p:cTn>
+                        </p:par>
+                      </p:childTnLst>
+                    </p:cTn>
+                  </p:par>
+                  <p:par>
+                    <p:cTn id="8" fill="hold">
+                      <p:stCondLst>
+                        <p:cond delay="indefinite"/>
+                      </p:stCondLst>
+                      <p:childTnLst>
+                        <p:par>
+                          <p:cTn id="9" fill="hold">
+                            <p:stCondLst>
+                              <p:cond delay="0"/>
+                            </p:stCondLst>
+                            <p:childTnLst>
+                              <p:par>
+                                <p:cTn id="10" presetID="9" presetClass="exit" presetSubtype="0" fill="hold" grpId="1" nodeType="clickEffect">
+                                  <p:stCondLst>
+                                    <p:cond delay="0"/>
+                                  </p:stCondLst>
+                                  <p:childTnLst>
+                                    <p:animEffect transition="out" filter="dissolve">
+                                      <p:cBhvr>
+                                        <p:cTn id="11" dur="500"/>
+                                        <p:tgtEl>
+                                          <p:spTgt spid="3">
+                                            <p:txEl>
+                                              <p:pRg st="0" end="0"/>
+                                            </p:txEl>
+                                          </p:spTgt>
+                                        </p:tgtEl>
+                                      </p:cBhvr>
+                                    </p:animEffect>
+                                    <p:set>
+                                      <p:cBhvr>
+                                        <p:cTn id="12" dur="1" fill="hold">
+                                          <p:stCondLst>
+                                            <p:cond delay="499"/>
+                                          </p:stCondLst>
+                                        </p:cTn>
+                                        <p:tgtEl>
+                                          <p:spTgt spid="3">
+                                            <p:txEl>
+                                              <p:pRg st="0" end="0"/>
+                                            </p:txEl>
+                                          </p:spTgt>
+                                        </p:tgtEl>
+                                        <p:attrNameLst>
+                                          <p:attrName>style.visibility</p:attrName>
+                                        </p:attrNameLst>
+                                      </p:cBhvr>
+                                      <p:to>
+                                        <p:strVal val="hidden"/>
+                                      </p:to>
+                                    </p:set>
+                                  </p:childTnLst>
+                                </p:cTn>
+                              </p:par>
+                            </p:childTnLst>
+                          </p:cTn>
+                        </p:par>
+                      </p:childTnLst>
+                    </p:cTn>
+                  </p:par>
+                </p:childTnLst>
+              </p:cTn>
+              <p:prevCondLst>
+                <p:cond evt="onPrev" delay="0">
+                  <p:tgtEl>
+                    <p:sldTgt/>
+                  </p:tgtEl>
+                </p:cond>
+              </p:prevCondLst>
+              <p:nextCondLst>
+                <p:cond evt="onNext" delay="0">
+                  <p:tgtEl>
+                    <p:sldTgt/>
+                  </p:tgtEl>
+                </p:cond>
+              </p:nextCondLst>
+            </p:seq>
+          </p:childTnLst>
+        </p:cTn>
+      </p:par>
+    </p:tnLst>
+    <p:bldLst>
+      <p:bldP spid="3" grpId="0" uiExpand="1" build="p"/>
+      <p:bldP spid="3" grpId="1" uiExpand="1" build="p"/>
+    </p:bldLst>
+  </p:timing>
+</p:sld>
+</file>
+
+<file path=ppt/slides/slide9.xml><?xml version="1.0" encoding="utf-8"?>
+<p:sld xmlns:a="http://schemas.openxmlformats.org/drawingml/2006/main" xmlns:r="http://schemas.openxmlformats.org/officeDocument/2006/relationships" xmlns:p="http://schemas.openxmlformats.org/presentationml/2006/main">
+  <p:cSld>
+    <p:spTree>
+      <p:nvGrpSpPr>
+        <p:cNvPr id="1" name=""/>
+        <p:cNvGrpSpPr/>
+        <p:nvPr/>
+      </p:nvGrpSpPr>
+      <p:grpSpPr>
+        <a:xfrm>
+          <a:off x="0" y="0"/>
+          <a:ext cx="0" cy="0"/>
+          <a:chOff x="0" y="0"/>
+          <a:chExt cx="0" cy="0"/>
+        </a:xfrm>
+      </p:grpSpPr>
+      <p:sp>
+        <p:nvSpPr>
+          <p:cNvPr id="3" name="Content Placeholder 2">
+            <a:extLst>
+              <a:ext uri="{FF2B5EF4-FFF2-40B4-BE49-F238E27FC236}">
+                <a16:creationId xmlns:a16="http://schemas.microsoft.com/office/drawing/2014/main" id="{C9044F89-E3C1-E349-B0DE-0B932821234C}"/>
+              </a:ext>
+            </a:extLst>
+          </p:cNvPr>
+          <p:cNvSpPr>
+            <a:spLocks noGrp="1"/>
+          </p:cNvSpPr>
+          <p:nvPr>
+            <p:ph idx="1"/>
+          </p:nvPr>
+        </p:nvSpPr>
+        <p:spPr>
+          <a:xfrm>
+            <a:off x="755374" y="1908313"/>
+            <a:ext cx="10749238" cy="4228195"/>
+          </a:xfrm>
+        </p:spPr>
+        <p:txBody>
+          <a:bodyPr>
+            <a:noAutofit/>
+          </a:bodyPr>
+          <a:lstStyle/>
+          <a:p>
+            <a:pPr algn="just"/>
+            <a:r>
+              <a:rPr lang="en-US" sz="2000" dirty="0">
+                <a:hlinkClick r:id="rId2"/>
+              </a:rPr>
+              <a:t>https://www.infoq.com/articles/managing-data-microservices</a:t>
+            </a:r>
+            <a:r>
+              <a:rPr lang="en-US" sz="2000" dirty="0"/>
+              <a:t> </a:t>
+            </a:r>
+          </a:p>
+          <a:p>
+            <a:pPr algn="just"/>
+            <a:r>
+              <a:rPr lang="en-US" sz="2000" dirty="0">
+                <a:hlinkClick r:id="rId3"/>
+              </a:rPr>
+              <a:t>https://medium.com/@nathankpeck/microservice-principles-decentralized-data-management-4adaceea173f</a:t>
+            </a:r>
+            <a:r>
+              <a:rPr lang="en-US" sz="2000" dirty="0"/>
+              <a:t> </a:t>
+            </a:r>
+          </a:p>
+          <a:p>
+            <a:pPr algn="just"/>
+            <a:r>
+              <a:rPr lang="en-US" sz="2000" dirty="0">
+                <a:hlinkClick r:id="rId4"/>
+              </a:rPr>
+              <a:t>https://martinfowler.com/articles/microservices.html</a:t>
+            </a:r>
+          </a:p>
+          <a:p>
+            <a:pPr algn="just"/>
+            <a:r>
+              <a:rPr lang="en-US" sz="2000" dirty="0">
+                <a:hlinkClick r:id="rId4"/>
+              </a:rPr>
+              <a:t>https://martinfowler.com/articles/break-monolith-into-microservices.html</a:t>
+            </a:r>
+            <a:r>
+              <a:rPr lang="en-US" sz="2000" dirty="0"/>
+              <a:t> </a:t>
+            </a:r>
+          </a:p>
+          <a:p>
+            <a:pPr algn="just"/>
+            <a:r>
+              <a:rPr lang="en-US" sz="2000" dirty="0">
+                <a:hlinkClick r:id="rId5"/>
+              </a:rPr>
+              <a:t>https://microservices.io</a:t>
+            </a:r>
+            <a:r>
+              <a:rPr lang="en-US" sz="2000" dirty="0"/>
+              <a:t> </a:t>
+            </a:r>
+          </a:p>
+          <a:p>
+            <a:pPr algn="just"/>
+            <a:r>
+              <a:rPr lang="en-US" sz="2000" dirty="0">
+                <a:hlinkClick r:id="rId6"/>
+              </a:rPr>
+              <a:t>https://dzone.com/articles/breaking-the-monolithic-database-in-your-microserv</a:t>
+            </a:r>
+            <a:r>
+              <a:rPr lang="en-US" sz="2000" dirty="0"/>
+              <a:t> </a:t>
+            </a:r>
+          </a:p>
+          <a:p>
+            <a:pPr algn="just"/>
+            <a:r>
+              <a:rPr lang="en-US" sz="2000" dirty="0">
+                <a:hlinkClick r:id="rId7"/>
+              </a:rPr>
+              <a:t>https://auth0.com/blog/an-introduction-to-microservices-part-1/</a:t>
+            </a:r>
+            <a:r>
+              <a:rPr lang="en-US" sz="2000" dirty="0"/>
+              <a:t> </a:t>
+            </a:r>
+          </a:p>
+          <a:p>
+            <a:pPr algn="just"/>
+            <a:r>
+              <a:rPr lang="en-US" sz="2000" dirty="0">
+                <a:hlinkClick r:id="rId8"/>
+              </a:rPr>
+              <a:t>http://blog.christianposta.com/microservices/the-hardest-part-about-microservices-data/</a:t>
+            </a:r>
+            <a:r>
+              <a:rPr lang="en-US" sz="2000" dirty="0"/>
+              <a:t> </a:t>
+            </a:r>
+            <a:endParaRPr lang="pt" sz="2000" dirty="0"/>
+          </a:p>
+        </p:txBody>
+      </p:sp>
+      <p:sp>
+        <p:nvSpPr>
+          <p:cNvPr id="4" name="Slide Number Placeholder 3">
+            <a:extLst>
+              <a:ext uri="{FF2B5EF4-FFF2-40B4-BE49-F238E27FC236}">
+                <a16:creationId xmlns:a16="http://schemas.microsoft.com/office/drawing/2014/main" id="{2EA509C2-078C-DE4C-BE59-C32AF18E82D6}"/>
+              </a:ext>
+            </a:extLst>
+          </p:cNvPr>
+          <p:cNvSpPr>
+            <a:spLocks noGrp="1"/>
+          </p:cNvSpPr>
+          <p:nvPr>
+            <p:ph type="sldNum" sz="quarter" idx="12"/>
+          </p:nvPr>
+        </p:nvSpPr>
+        <p:spPr/>
+        <p:txBody>
+          <a:bodyPr/>
+          <a:lstStyle/>
+          <a:p>
+            <a:fld id="{2183B7EE-0FBE-B749-875F-ED24F5ECD71F}" type="slidenum">
+              <a:rPr lang="en-US" smtClean="0"/>
+              <a:t>9</a:t>
             </a:fld>
             <a:endParaRPr lang="en-US" dirty="0"/>
           </a:p>

</xml_diff>